<commit_message>
TopTeam: Updated AnalyticalFramework presentation, added TechDoc and Requirements presentation
</commit_message>
<xml_diff>
--- a/TopTeam-Kor-Kan-Kra/AnalyticalFramework.pptx
+++ b/TopTeam-Kor-Kan-Kra/AnalyticalFramework.pptx
@@ -7,10 +7,11 @@
   <p:sldIdLst>
     <p:sldId id="256" r:id="rId2"/>
     <p:sldId id="257" r:id="rId3"/>
-    <p:sldId id="258" r:id="rId4"/>
-    <p:sldId id="259" r:id="rId5"/>
-    <p:sldId id="260" r:id="rId6"/>
-    <p:sldId id="261" r:id="rId7"/>
+    <p:sldId id="262" r:id="rId4"/>
+    <p:sldId id="258" r:id="rId5"/>
+    <p:sldId id="259" r:id="rId6"/>
+    <p:sldId id="260" r:id="rId7"/>
+    <p:sldId id="261" r:id="rId8"/>
   </p:sldIdLst>
   <p:sldSz cx="12192000" cy="6858000"/>
   <p:notesSz cx="6858000" cy="9144000"/>
@@ -305,7 +306,7 @@
           <a:p>
             <a:fld id="{FDC44AA6-1400-4BB8-A60E-3A6BCF70122E}" type="datetimeFigureOut">
               <a:rPr lang="en-US" smtClean="0"/>
-              <a:t>3/1/2015</a:t>
+              <a:t>4/2/2015</a:t>
             </a:fld>
             <a:endParaRPr lang="en-US"/>
           </a:p>
@@ -643,7 +644,7 @@
           <a:p>
             <a:fld id="{FDC44AA6-1400-4BB8-A60E-3A6BCF70122E}" type="datetimeFigureOut">
               <a:rPr lang="en-US" smtClean="0"/>
-              <a:t>3/1/2015</a:t>
+              <a:t>4/2/2015</a:t>
             </a:fld>
             <a:endParaRPr lang="en-US"/>
           </a:p>
@@ -1044,7 +1045,7 @@
           <a:p>
             <a:fld id="{FDC44AA6-1400-4BB8-A60E-3A6BCF70122E}" type="datetimeFigureOut">
               <a:rPr lang="en-US" smtClean="0"/>
-              <a:t>3/1/2015</a:t>
+              <a:t>4/2/2015</a:t>
             </a:fld>
             <a:endParaRPr lang="en-US"/>
           </a:p>
@@ -1380,7 +1381,7 @@
           <a:p>
             <a:fld id="{FDC44AA6-1400-4BB8-A60E-3A6BCF70122E}" type="datetimeFigureOut">
               <a:rPr lang="en-US" smtClean="0"/>
-              <a:t>3/1/2015</a:t>
+              <a:t>4/2/2015</a:t>
             </a:fld>
             <a:endParaRPr lang="en-US"/>
           </a:p>
@@ -1700,7 +1701,7 @@
           <a:p>
             <a:fld id="{FDC44AA6-1400-4BB8-A60E-3A6BCF70122E}" type="datetimeFigureOut">
               <a:rPr lang="en-US" smtClean="0"/>
-              <a:t>3/1/2015</a:t>
+              <a:t>4/2/2015</a:t>
             </a:fld>
             <a:endParaRPr lang="en-US"/>
           </a:p>
@@ -2096,7 +2097,7 @@
           <a:p>
             <a:fld id="{FDC44AA6-1400-4BB8-A60E-3A6BCF70122E}" type="datetimeFigureOut">
               <a:rPr lang="en-US" smtClean="0"/>
-              <a:t>3/1/2015</a:t>
+              <a:t>4/2/2015</a:t>
             </a:fld>
             <a:endParaRPr lang="en-US"/>
           </a:p>
@@ -2353,7 +2354,7 @@
           <a:p>
             <a:fld id="{FDC44AA6-1400-4BB8-A60E-3A6BCF70122E}" type="datetimeFigureOut">
               <a:rPr lang="en-US" smtClean="0"/>
-              <a:t>3/1/2015</a:t>
+              <a:t>4/2/2015</a:t>
             </a:fld>
             <a:endParaRPr lang="en-US"/>
           </a:p>
@@ -2615,7 +2616,7 @@
           <a:p>
             <a:fld id="{FDC44AA6-1400-4BB8-A60E-3A6BCF70122E}" type="datetimeFigureOut">
               <a:rPr lang="en-US" smtClean="0"/>
-              <a:t>3/1/2015</a:t>
+              <a:t>4/2/2015</a:t>
             </a:fld>
             <a:endParaRPr lang="en-US"/>
           </a:p>
@@ -2877,7 +2878,7 @@
           <a:p>
             <a:fld id="{FDC44AA6-1400-4BB8-A60E-3A6BCF70122E}" type="datetimeFigureOut">
               <a:rPr lang="en-US" smtClean="0"/>
-              <a:t>3/1/2015</a:t>
+              <a:t>4/2/2015</a:t>
             </a:fld>
             <a:endParaRPr lang="en-US"/>
           </a:p>
@@ -3206,7 +3207,7 @@
           <a:p>
             <a:fld id="{FDC44AA6-1400-4BB8-A60E-3A6BCF70122E}" type="datetimeFigureOut">
               <a:rPr lang="en-US" smtClean="0"/>
-              <a:t>3/1/2015</a:t>
+              <a:t>4/2/2015</a:t>
             </a:fld>
             <a:endParaRPr lang="en-US"/>
           </a:p>
@@ -3529,7 +3530,7 @@
           <a:p>
             <a:fld id="{FDC44AA6-1400-4BB8-A60E-3A6BCF70122E}" type="datetimeFigureOut">
               <a:rPr lang="en-US" smtClean="0"/>
-              <a:t>3/1/2015</a:t>
+              <a:t>4/2/2015</a:t>
             </a:fld>
             <a:endParaRPr lang="en-US"/>
           </a:p>
@@ -3986,7 +3987,7 @@
           <a:p>
             <a:fld id="{FDC44AA6-1400-4BB8-A60E-3A6BCF70122E}" type="datetimeFigureOut">
               <a:rPr lang="en-US" smtClean="0"/>
-              <a:t>3/1/2015</a:t>
+              <a:t>4/2/2015</a:t>
             </a:fld>
             <a:endParaRPr lang="en-US"/>
           </a:p>
@@ -4191,7 +4192,7 @@
           <a:p>
             <a:fld id="{FDC44AA6-1400-4BB8-A60E-3A6BCF70122E}" type="datetimeFigureOut">
               <a:rPr lang="en-US" smtClean="0"/>
-              <a:t>3/1/2015</a:t>
+              <a:t>4/2/2015</a:t>
             </a:fld>
             <a:endParaRPr lang="en-US"/>
           </a:p>
@@ -4368,7 +4369,7 @@
           <a:p>
             <a:fld id="{FDC44AA6-1400-4BB8-A60E-3A6BCF70122E}" type="datetimeFigureOut">
               <a:rPr lang="en-US" smtClean="0"/>
-              <a:t>3/1/2015</a:t>
+              <a:t>4/2/2015</a:t>
             </a:fld>
             <a:endParaRPr lang="en-US"/>
           </a:p>
@@ -4701,7 +4702,7 @@
           <a:p>
             <a:fld id="{FDC44AA6-1400-4BB8-A60E-3A6BCF70122E}" type="datetimeFigureOut">
               <a:rPr lang="en-US" smtClean="0"/>
-              <a:t>3/1/2015</a:t>
+              <a:t>4/2/2015</a:t>
             </a:fld>
             <a:endParaRPr lang="en-US"/>
           </a:p>
@@ -5046,7 +5047,7 @@
           <a:p>
             <a:fld id="{FDC44AA6-1400-4BB8-A60E-3A6BCF70122E}" type="datetimeFigureOut">
               <a:rPr lang="en-US" smtClean="0"/>
-              <a:t>3/1/2015</a:t>
+              <a:t>4/2/2015</a:t>
             </a:fld>
             <a:endParaRPr lang="en-US"/>
           </a:p>
@@ -7163,7 +7164,7 @@
           <a:p>
             <a:fld id="{FDC44AA6-1400-4BB8-A60E-3A6BCF70122E}" type="datetimeFigureOut">
               <a:rPr lang="en-US" smtClean="0"/>
-              <a:t>3/1/2015</a:t>
+              <a:t>4/2/2015</a:t>
             </a:fld>
             <a:endParaRPr lang="en-US"/>
           </a:p>
@@ -8020,7 +8021,7 @@
           <a:p>
             <a:r>
               <a:rPr lang="ru-RU" dirty="0" smtClean="0"/>
-              <a:t>Целевая аудитория</a:t>
+              <a:t>Введение</a:t>
             </a:r>
             <a:endParaRPr lang="en-US" dirty="0"/>
           </a:p>
@@ -8038,7 +8039,9 @@
         </p:nvSpPr>
         <p:spPr/>
         <p:txBody>
-          <a:bodyPr/>
+          <a:bodyPr>
+            <a:normAutofit/>
+          </a:bodyPr>
           <a:lstStyle/>
           <a:p>
             <a:r>
@@ -8047,7 +8050,23 @@
                   <a:srgbClr val="404040"/>
                 </a:solidFill>
               </a:rPr>
-              <a:t>B2B</a:t>
+              <a:t>При разработке и сопровождении ПО часто необходимо проведение анализа </a:t>
+            </a:r>
+            <a:r>
+              <a:rPr lang="ru-RU" dirty="0" smtClean="0">
+                <a:solidFill>
+                  <a:srgbClr val="404040"/>
+                </a:solidFill>
+              </a:rPr>
+              <a:t>статистических </a:t>
+            </a:r>
+            <a:r>
+              <a:rPr lang="ru-RU" dirty="0">
+                <a:solidFill>
+                  <a:srgbClr val="404040"/>
+                </a:solidFill>
+              </a:rPr>
+              <a:t>данных об использовании разрабатываемого продукта. </a:t>
             </a:r>
             <a:endParaRPr lang="ru-RU" dirty="0"/>
           </a:p>
@@ -8059,33 +8078,39 @@
                   <a:srgbClr val="404040"/>
                 </a:solidFill>
               </a:rPr>
-              <a:t>Малый и средний бизнес IT области (Количество клиентов не превышает ~1000000)</a:t>
-            </a:r>
-            <a:endParaRPr lang="ru-RU" dirty="0"/>
-          </a:p>
-          <a:p>
-            <a:pPr lvl="1"/>
+              <a:t>К примеру, для совершенствования мобильного клиента популярного сайта «</a:t>
+            </a:r>
+            <a:r>
+              <a:rPr lang="ru-RU" dirty="0" err="1">
+                <a:solidFill>
+                  <a:srgbClr val="404040"/>
+                </a:solidFill>
+              </a:rPr>
+              <a:t>Вконтакте</a:t>
+            </a:r>
             <a:r>
               <a:rPr lang="ru-RU" dirty="0">
                 <a:solidFill>
                   <a:srgbClr val="404040"/>
                 </a:solidFill>
               </a:rPr>
-              <a:t>Ключевым фактором, влияющим на возможность использования нашей системы, является степень обеспечения приватности клиентов компании. </a:t>
-            </a:r>
-            <a:endParaRPr lang="ru-RU" dirty="0"/>
-          </a:p>
-          <a:p>
-            <a:pPr lvl="1"/>
-            <a:r>
-              <a:rPr lang="ru-RU" dirty="0">
+              <a:t>» нам полезно строить воронки, то есть анализировать информацию: «100 пользователей зашли на основной экран», «13 пользователей решили зарегистрироваться», «10 пользователей закончили регистрацию». Такая воронка позволяет увидеть, что только чуть более 10% пользователей решают зарегистрироваться и почти все завершают регистрацию. Значит в первую очередь необходимо улучшать основной экран приложения.  </a:t>
+            </a:r>
+            <a:endParaRPr lang="ru-RU" dirty="0" smtClean="0">
+              <a:solidFill>
+                <a:srgbClr val="404040"/>
+              </a:solidFill>
+            </a:endParaRPr>
+          </a:p>
+          <a:p>
+            <a:r>
+              <a:rPr lang="ru-RU" dirty="0" smtClean="0">
                 <a:solidFill>
                   <a:srgbClr val="404040"/>
                 </a:solidFill>
               </a:rPr>
-              <a:t>Наши клиенты должны понимать, имеют ли они право собирать статистические данные их клиентов.</a:t>
-            </a:r>
-            <a:endParaRPr lang="ru-RU" dirty="0"/>
+              <a:t>Внедрение нашей системы в разрабатываемые продукты позволяет проводить подобную аналитику.</a:t>
+            </a:r>
           </a:p>
         </p:txBody>
       </p:sp>
@@ -8143,7 +8168,7 @@
           <a:p>
             <a:r>
               <a:rPr lang="ru-RU" dirty="0" smtClean="0"/>
-              <a:t>Описание</a:t>
+              <a:t>Целевая аудитория</a:t>
             </a:r>
             <a:endParaRPr lang="en-US" dirty="0"/>
           </a:p>
@@ -8170,51 +8195,43 @@
                   <a:srgbClr val="404040"/>
                 </a:solidFill>
               </a:rPr>
-              <a:t>Система разделяется на клиентскую и серверную части. </a:t>
+              <a:t>B2B</a:t>
             </a:r>
             <a:endParaRPr lang="ru-RU" dirty="0"/>
           </a:p>
           <a:p>
+            <a:pPr lvl="1"/>
             <a:r>
               <a:rPr lang="ru-RU" dirty="0">
                 <a:solidFill>
                   <a:srgbClr val="404040"/>
                 </a:solidFill>
               </a:rPr>
-              <a:t>Наши клиенты внедряют клиентскую часть системы в свои продукты.</a:t>
+              <a:t>Малый и средний бизнес IT области (Количество клиентов не превышает ~1000000)</a:t>
             </a:r>
             <a:endParaRPr lang="ru-RU" dirty="0"/>
           </a:p>
           <a:p>
+            <a:pPr lvl="1"/>
             <a:r>
               <a:rPr lang="ru-RU" dirty="0">
                 <a:solidFill>
                   <a:srgbClr val="404040"/>
                 </a:solidFill>
               </a:rPr>
-              <a:t>Серверная часть нашей системы устанавливается на сервера наших клиентов.</a:t>
+              <a:t>Ключевым фактором, влияющим на возможность использования нашей системы, является степень обеспечения приватности клиентов компании. </a:t>
             </a:r>
             <a:endParaRPr lang="ru-RU" dirty="0"/>
           </a:p>
           <a:p>
+            <a:pPr lvl="1"/>
             <a:r>
               <a:rPr lang="ru-RU" dirty="0">
                 <a:solidFill>
                   <a:srgbClr val="404040"/>
                 </a:solidFill>
               </a:rPr>
-              <a:t>В ходе использования продуктов с внедренной клиентской частью на сервера наших клиентов будет отправляться статистическая информация. Например, «пользователь зашел в приложение», «пользователь зашел в настройки», «пользователь зарегистрировал аккаунт» и т.д.</a:t>
-            </a:r>
-            <a:endParaRPr lang="ru-RU" dirty="0"/>
-          </a:p>
-          <a:p>
-            <a:r>
-              <a:rPr lang="ru-RU" dirty="0">
-                <a:solidFill>
-                  <a:srgbClr val="404040"/>
-                </a:solidFill>
-              </a:rPr>
-              <a:t>Вся информация собирается на серверах у наших клиентов.</a:t>
+              <a:t>Наши клиенты должны понимать, имеют ли они право собирать статистические данные их клиентов.</a:t>
             </a:r>
             <a:endParaRPr lang="ru-RU" dirty="0"/>
           </a:p>
@@ -8223,7 +8240,7 @@
     </p:spTree>
     <p:extLst>
       <p:ext uri="{BB962C8B-B14F-4D97-AF65-F5344CB8AC3E}">
-        <p14:creationId xmlns:p14="http://schemas.microsoft.com/office/powerpoint/2010/main" val="366392151"/>
+        <p14:creationId xmlns:p14="http://schemas.microsoft.com/office/powerpoint/2010/main" val="810059192"/>
       </p:ext>
     </p:extLst>
   </p:cSld>
@@ -8292,7 +8309,9 @@
         </p:nvSpPr>
         <p:spPr/>
         <p:txBody>
-          <a:bodyPr/>
+          <a:bodyPr>
+            <a:normAutofit/>
+          </a:bodyPr>
           <a:lstStyle/>
           <a:p>
             <a:r>
@@ -8301,115 +8320,48 @@
                   <a:srgbClr val="404040"/>
                 </a:solidFill>
               </a:rPr>
-              <a:t>Серверная часть системы позволяет работать с собранными данными</a:t>
+              <a:t>Система разделяется на клиентскую и серверную </a:t>
+            </a:r>
+            <a:r>
+              <a:rPr lang="ru-RU" dirty="0" smtClean="0">
+                <a:solidFill>
+                  <a:srgbClr val="404040"/>
+                </a:solidFill>
+              </a:rPr>
+              <a:t>части, а также «паука». </a:t>
             </a:r>
             <a:endParaRPr lang="ru-RU" dirty="0"/>
           </a:p>
           <a:p>
-            <a:pPr lvl="1"/>
             <a:r>
               <a:rPr lang="ru-RU" dirty="0">
                 <a:solidFill>
                   <a:srgbClr val="404040"/>
                 </a:solidFill>
               </a:rPr>
-              <a:t>DAU / MAU</a:t>
+              <a:t>Наши клиенты внедряют клиентскую часть системы в свои продукты.</a:t>
             </a:r>
             <a:endParaRPr lang="ru-RU" dirty="0"/>
           </a:p>
           <a:p>
-            <a:pPr lvl="1"/>
-            <a:r>
-              <a:rPr lang="ru-RU" dirty="0" err="1">
+            <a:r>
+              <a:rPr lang="ru-RU" dirty="0">
                 <a:solidFill>
                   <a:srgbClr val="404040"/>
                 </a:solidFill>
               </a:rPr>
-              <a:t>Когортный</a:t>
-            </a:r>
-            <a:r>
-              <a:rPr lang="ru-RU" dirty="0">
+              <a:t>Серверная часть нашей системы устанавливается на сервера наших клиентов.</a:t>
+            </a:r>
+            <a:endParaRPr lang="ru-RU" dirty="0"/>
+          </a:p>
+          <a:p>
+            <a:r>
+              <a:rPr lang="ru-RU" dirty="0" smtClean="0">
                 <a:solidFill>
                   <a:srgbClr val="404040"/>
                 </a:solidFill>
               </a:rPr>
-              <a:t> анализ</a:t>
-            </a:r>
-            <a:endParaRPr lang="ru-RU" dirty="0"/>
-          </a:p>
-          <a:p>
-            <a:pPr lvl="1"/>
-            <a:r>
-              <a:rPr lang="ru-RU" dirty="0">
-                <a:solidFill>
-                  <a:srgbClr val="404040"/>
-                </a:solidFill>
-              </a:rPr>
-              <a:t>Исследование воронок</a:t>
-            </a:r>
-            <a:endParaRPr lang="ru-RU" dirty="0"/>
-          </a:p>
-          <a:p>
-            <a:pPr lvl="1"/>
-            <a:r>
-              <a:rPr lang="ru-RU" dirty="0">
-                <a:solidFill>
-                  <a:srgbClr val="404040"/>
-                </a:solidFill>
-              </a:rPr>
-              <a:t>Иные метрики</a:t>
-            </a:r>
-            <a:endParaRPr lang="ru-RU" dirty="0"/>
-          </a:p>
-          <a:p>
-            <a:pPr lvl="1"/>
-            <a:r>
-              <a:rPr lang="ru-RU" dirty="0" err="1">
-                <a:solidFill>
-                  <a:srgbClr val="404040"/>
-                </a:solidFill>
-              </a:rPr>
-              <a:t>Quality</a:t>
-            </a:r>
-            <a:r>
-              <a:rPr lang="ru-RU" dirty="0">
-                <a:solidFill>
-                  <a:srgbClr val="404040"/>
-                </a:solidFill>
-              </a:rPr>
-              <a:t> </a:t>
-            </a:r>
-            <a:r>
-              <a:rPr lang="ru-RU" dirty="0" err="1">
-                <a:solidFill>
-                  <a:srgbClr val="404040"/>
-                </a:solidFill>
-              </a:rPr>
-              <a:t>assurance</a:t>
-            </a:r>
-            <a:endParaRPr lang="ru-RU" dirty="0"/>
-          </a:p>
-          <a:p>
-            <a:pPr lvl="1"/>
-            <a:r>
-              <a:rPr lang="ru-RU" dirty="0">
-                <a:solidFill>
-                  <a:srgbClr val="404040"/>
-                </a:solidFill>
-              </a:rPr>
-              <a:t>Исследование паттернов использования</a:t>
-            </a:r>
-            <a:endParaRPr lang="ru-RU" dirty="0"/>
-          </a:p>
-          <a:p>
-            <a:pPr lvl="1"/>
-            <a:r>
-              <a:rPr lang="ru-RU" dirty="0">
-                <a:solidFill>
-                  <a:srgbClr val="404040"/>
-                </a:solidFill>
-              </a:rPr>
-              <a:t>…</a:t>
+              <a:t>Конечные пользователи при использовании продукта с внедренной клиентской частью автоматически отправляют информацию в распределенное хранилище, из которого с определенной периодичностью «паук» собирает доступные данные и размещает в базе данных на серверной части.</a:t>
             </a:r>
             <a:endParaRPr lang="ru-RU" dirty="0"/>
           </a:p>
@@ -8418,7 +8370,7 @@
     </p:spTree>
     <p:extLst>
       <p:ext uri="{BB962C8B-B14F-4D97-AF65-F5344CB8AC3E}">
-        <p14:creationId xmlns:p14="http://schemas.microsoft.com/office/powerpoint/2010/main" val="1876053803"/>
+        <p14:creationId xmlns:p14="http://schemas.microsoft.com/office/powerpoint/2010/main" val="366392151"/>
       </p:ext>
     </p:extLst>
   </p:cSld>
@@ -8469,7 +8421,7 @@
           <a:p>
             <a:r>
               <a:rPr lang="ru-RU" dirty="0" smtClean="0"/>
-              <a:t>Структура</a:t>
+              <a:t>Описание</a:t>
             </a:r>
             <a:endParaRPr lang="en-US" dirty="0"/>
           </a:p>
@@ -8496,7 +8448,7 @@
                   <a:srgbClr val="404040"/>
                 </a:solidFill>
               </a:rPr>
-              <a:t>Клиентская часть</a:t>
+              <a:t>Серверная часть системы позволяет работать с собранными данными</a:t>
             </a:r>
             <a:endParaRPr lang="ru-RU" dirty="0"/>
           </a:p>
@@ -8508,19 +8460,103 @@
                   <a:srgbClr val="404040"/>
                 </a:solidFill>
               </a:rPr>
-              <a:t>Программный модуль. Позволяет внедрять в код продуктов клиентов возможность отправки практически любых данных на серверную часть. </a:t>
+              <a:t>DAU / MAU</a:t>
             </a:r>
             <a:endParaRPr lang="ru-RU" dirty="0"/>
           </a:p>
           <a:p>
             <a:pPr lvl="1"/>
             <a:r>
+              <a:rPr lang="ru-RU" dirty="0" err="1">
+                <a:solidFill>
+                  <a:srgbClr val="404040"/>
+                </a:solidFill>
+              </a:rPr>
+              <a:t>Когортный</a:t>
+            </a:r>
+            <a:r>
               <a:rPr lang="ru-RU" dirty="0">
                 <a:solidFill>
                   <a:srgbClr val="404040"/>
                 </a:solidFill>
               </a:rPr>
-              <a:t>При внедрении клиенты самостоятельно решают какую информацию и в какой форме они хотят отправлять на сервера. Именно в данной фазе необходимо контролировать обеспечение сохранности приватных данных пользователей. </a:t>
+              <a:t> анализ</a:t>
+            </a:r>
+            <a:endParaRPr lang="ru-RU" dirty="0"/>
+          </a:p>
+          <a:p>
+            <a:pPr lvl="1"/>
+            <a:r>
+              <a:rPr lang="ru-RU" dirty="0">
+                <a:solidFill>
+                  <a:srgbClr val="404040"/>
+                </a:solidFill>
+              </a:rPr>
+              <a:t>Исследование воронок</a:t>
+            </a:r>
+            <a:endParaRPr lang="ru-RU" dirty="0"/>
+          </a:p>
+          <a:p>
+            <a:pPr lvl="1"/>
+            <a:r>
+              <a:rPr lang="ru-RU" dirty="0">
+                <a:solidFill>
+                  <a:srgbClr val="404040"/>
+                </a:solidFill>
+              </a:rPr>
+              <a:t>Иные метрики</a:t>
+            </a:r>
+            <a:endParaRPr lang="ru-RU" dirty="0"/>
+          </a:p>
+          <a:p>
+            <a:pPr lvl="1"/>
+            <a:r>
+              <a:rPr lang="ru-RU" dirty="0" err="1">
+                <a:solidFill>
+                  <a:srgbClr val="404040"/>
+                </a:solidFill>
+              </a:rPr>
+              <a:t>Quality</a:t>
+            </a:r>
+            <a:r>
+              <a:rPr lang="ru-RU" dirty="0">
+                <a:solidFill>
+                  <a:srgbClr val="404040"/>
+                </a:solidFill>
+              </a:rPr>
+              <a:t> </a:t>
+            </a:r>
+            <a:r>
+              <a:rPr lang="ru-RU" dirty="0" err="1">
+                <a:solidFill>
+                  <a:srgbClr val="404040"/>
+                </a:solidFill>
+              </a:rPr>
+              <a:t>assurance</a:t>
+            </a:r>
+            <a:endParaRPr lang="ru-RU" dirty="0"/>
+          </a:p>
+          <a:p>
+            <a:pPr lvl="1"/>
+            <a:r>
+              <a:rPr lang="ru-RU" dirty="0">
+                <a:solidFill>
+                  <a:srgbClr val="404040"/>
+                </a:solidFill>
+              </a:rPr>
+              <a:t>Исследование паттернов использования</a:t>
+            </a:r>
+            <a:endParaRPr lang="ru-RU" dirty="0"/>
+          </a:p>
+          <a:p>
+            <a:pPr lvl="1"/>
+            <a:r>
+              <a:rPr lang="ru-RU" dirty="0">
+                <a:solidFill>
+                  <a:srgbClr val="404040"/>
+                </a:solidFill>
+              </a:rPr>
+              <a:t>…</a:t>
             </a:r>
             <a:endParaRPr lang="ru-RU" dirty="0"/>
           </a:p>
@@ -8529,7 +8565,7 @@
     </p:spTree>
     <p:extLst>
       <p:ext uri="{BB962C8B-B14F-4D97-AF65-F5344CB8AC3E}">
-        <p14:creationId xmlns:p14="http://schemas.microsoft.com/office/powerpoint/2010/main" val="1104167263"/>
+        <p14:creationId xmlns:p14="http://schemas.microsoft.com/office/powerpoint/2010/main" val="1876053803"/>
       </p:ext>
     </p:extLst>
   </p:cSld>
@@ -8607,6 +8643,117 @@
                   <a:srgbClr val="404040"/>
                 </a:solidFill>
               </a:rPr>
+              <a:t>Клиентская часть</a:t>
+            </a:r>
+            <a:endParaRPr lang="ru-RU" dirty="0"/>
+          </a:p>
+          <a:p>
+            <a:pPr lvl="1"/>
+            <a:r>
+              <a:rPr lang="ru-RU" dirty="0">
+                <a:solidFill>
+                  <a:srgbClr val="404040"/>
+                </a:solidFill>
+              </a:rPr>
+              <a:t>Программный модуль. Позволяет внедрять в код продуктов клиентов возможность отправки практически любых данных на серверную часть. </a:t>
+            </a:r>
+            <a:endParaRPr lang="ru-RU" dirty="0"/>
+          </a:p>
+          <a:p>
+            <a:pPr lvl="1"/>
+            <a:r>
+              <a:rPr lang="ru-RU" dirty="0">
+                <a:solidFill>
+                  <a:srgbClr val="404040"/>
+                </a:solidFill>
+              </a:rPr>
+              <a:t>При внедрении клиенты самостоятельно решают какую информацию и в какой форме они хотят отправлять на сервера. Именно в данной фазе необходимо контролировать обеспечение сохранности приватных данных пользователей. </a:t>
+            </a:r>
+            <a:endParaRPr lang="ru-RU" dirty="0"/>
+          </a:p>
+        </p:txBody>
+      </p:sp>
+    </p:spTree>
+    <p:extLst>
+      <p:ext uri="{BB962C8B-B14F-4D97-AF65-F5344CB8AC3E}">
+        <p14:creationId xmlns:p14="http://schemas.microsoft.com/office/powerpoint/2010/main" val="1104167263"/>
+      </p:ext>
+    </p:extLst>
+  </p:cSld>
+  <p:clrMapOvr>
+    <a:masterClrMapping/>
+  </p:clrMapOvr>
+  <p:timing>
+    <p:tnLst>
+      <p:par>
+        <p:cTn id="1" dur="indefinite" restart="never" nodeType="tmRoot"/>
+      </p:par>
+    </p:tnLst>
+  </p:timing>
+</p:sld>
+</file>
+
+<file path=ppt/slides/slide7.xml><?xml version="1.0" encoding="utf-8"?>
+<p:sld xmlns:a="http://schemas.openxmlformats.org/drawingml/2006/main" xmlns:r="http://schemas.openxmlformats.org/officeDocument/2006/relationships" xmlns:p="http://schemas.openxmlformats.org/presentationml/2006/main">
+  <p:cSld>
+    <p:spTree>
+      <p:nvGrpSpPr>
+        <p:cNvPr id="1" name=""/>
+        <p:cNvGrpSpPr/>
+        <p:nvPr/>
+      </p:nvGrpSpPr>
+      <p:grpSpPr>
+        <a:xfrm>
+          <a:off x="0" y="0"/>
+          <a:ext cx="0" cy="0"/>
+          <a:chOff x="0" y="0"/>
+          <a:chExt cx="0" cy="0"/>
+        </a:xfrm>
+      </p:grpSpPr>
+      <p:sp>
+        <p:nvSpPr>
+          <p:cNvPr id="2" name="Title 1"/>
+          <p:cNvSpPr>
+            <a:spLocks noGrp="1"/>
+          </p:cNvSpPr>
+          <p:nvPr>
+            <p:ph type="title"/>
+          </p:nvPr>
+        </p:nvSpPr>
+        <p:spPr/>
+        <p:txBody>
+          <a:bodyPr/>
+          <a:lstStyle/>
+          <a:p>
+            <a:r>
+              <a:rPr lang="ru-RU" dirty="0" smtClean="0"/>
+              <a:t>Структура</a:t>
+            </a:r>
+            <a:endParaRPr lang="en-US" dirty="0"/>
+          </a:p>
+        </p:txBody>
+      </p:sp>
+      <p:sp>
+        <p:nvSpPr>
+          <p:cNvPr id="3" name="Content Placeholder 2"/>
+          <p:cNvSpPr>
+            <a:spLocks noGrp="1"/>
+          </p:cNvSpPr>
+          <p:nvPr>
+            <p:ph idx="1"/>
+          </p:nvPr>
+        </p:nvSpPr>
+        <p:spPr/>
+        <p:txBody>
+          <a:bodyPr/>
+          <a:lstStyle/>
+          <a:p>
+            <a:r>
+              <a:rPr lang="ru-RU" dirty="0">
+                <a:solidFill>
+                  <a:srgbClr val="404040"/>
+                </a:solidFill>
+              </a:rPr>
               <a:t>Серверная часть</a:t>
             </a:r>
             <a:endParaRPr lang="ru-RU" dirty="0"/>
@@ -8643,19 +8790,26 @@
                   <a:srgbClr val="404040"/>
                 </a:solidFill>
               </a:rPr>
-              <a:t>Коллекция готовых запросов, осуществляющих наиболее популярные методы анализа.</a:t>
-            </a:r>
-            <a:endParaRPr lang="ru-RU" dirty="0"/>
+              <a:t>Коллекция готовых запросов, осуществляющих наиболее популярные методы анализа</a:t>
+            </a:r>
+            <a:r>
+              <a:rPr lang="ru-RU" dirty="0" smtClean="0">
+                <a:solidFill>
+                  <a:srgbClr val="404040"/>
+                </a:solidFill>
+              </a:rPr>
+              <a:t>.</a:t>
+            </a:r>
           </a:p>
           <a:p>
             <a:pPr lvl="1"/>
             <a:r>
-              <a:rPr lang="ru-RU" dirty="0">
+              <a:rPr lang="ru-RU" smtClean="0">
                 <a:solidFill>
                   <a:srgbClr val="404040"/>
                 </a:solidFill>
               </a:rPr>
-              <a:t>Визуализатор данных. </a:t>
+              <a:t>Визуализатор данных</a:t>
             </a:r>
             <a:endParaRPr lang="ru-RU" dirty="0"/>
           </a:p>

</xml_diff>